<commit_message>
Fix error reporting multiple photo upload
</commit_message>
<xml_diff>
--- a/Documents/SprintReports/Client Presentation 3.pptx
+++ b/Documents/SprintReports/Client Presentation 3.pptx
@@ -213,7 +213,7 @@
           <a:p>
             <a:fld id="{0F250BAB-F222-44A0-92A7-79382282376D}" type="datetimeFigureOut">
               <a:rPr lang="en-US" smtClean="0"/>
-              <a:t>3/23/2016</a:t>
+              <a:t>3/24/2016</a:t>
             </a:fld>
             <a:endParaRPr lang="en-US"/>
           </a:p>
@@ -1102,7 +1102,7 @@
           <a:p>
             <a:fld id="{8BDB0DE8-2E6D-4292-891D-D68A0AAB909C}" type="datetimeFigureOut">
               <a:rPr lang="en-US" smtClean="0"/>
-              <a:t>3/23/2016</a:t>
+              <a:t>3/24/2016</a:t>
             </a:fld>
             <a:endParaRPr lang="en-US"/>
           </a:p>
@@ -1272,7 +1272,7 @@
           <a:p>
             <a:fld id="{8BDB0DE8-2E6D-4292-891D-D68A0AAB909C}" type="datetimeFigureOut">
               <a:rPr lang="en-US" smtClean="0"/>
-              <a:t>3/23/2016</a:t>
+              <a:t>3/24/2016</a:t>
             </a:fld>
             <a:endParaRPr lang="en-US"/>
           </a:p>
@@ -1452,7 +1452,7 @@
           <a:p>
             <a:fld id="{8BDB0DE8-2E6D-4292-891D-D68A0AAB909C}" type="datetimeFigureOut">
               <a:rPr lang="en-US" smtClean="0"/>
-              <a:t>3/23/2016</a:t>
+              <a:t>3/24/2016</a:t>
             </a:fld>
             <a:endParaRPr lang="en-US"/>
           </a:p>
@@ -1622,7 +1622,7 @@
           <a:p>
             <a:fld id="{8BDB0DE8-2E6D-4292-891D-D68A0AAB909C}" type="datetimeFigureOut">
               <a:rPr lang="en-US" smtClean="0"/>
-              <a:t>3/23/2016</a:t>
+              <a:t>3/24/2016</a:t>
             </a:fld>
             <a:endParaRPr lang="en-US"/>
           </a:p>
@@ -1868,7 +1868,7 @@
           <a:p>
             <a:fld id="{8BDB0DE8-2E6D-4292-891D-D68A0AAB909C}" type="datetimeFigureOut">
               <a:rPr lang="en-US" smtClean="0"/>
-              <a:t>3/23/2016</a:t>
+              <a:t>3/24/2016</a:t>
             </a:fld>
             <a:endParaRPr lang="en-US"/>
           </a:p>
@@ -2156,7 +2156,7 @@
           <a:p>
             <a:fld id="{8BDB0DE8-2E6D-4292-891D-D68A0AAB909C}" type="datetimeFigureOut">
               <a:rPr lang="en-US" smtClean="0"/>
-              <a:t>3/23/2016</a:t>
+              <a:t>3/24/2016</a:t>
             </a:fld>
             <a:endParaRPr lang="en-US"/>
           </a:p>
@@ -2578,7 +2578,7 @@
           <a:p>
             <a:fld id="{8BDB0DE8-2E6D-4292-891D-D68A0AAB909C}" type="datetimeFigureOut">
               <a:rPr lang="en-US" smtClean="0"/>
-              <a:t>3/23/2016</a:t>
+              <a:t>3/24/2016</a:t>
             </a:fld>
             <a:endParaRPr lang="en-US"/>
           </a:p>
@@ -2696,7 +2696,7 @@
           <a:p>
             <a:fld id="{8BDB0DE8-2E6D-4292-891D-D68A0AAB909C}" type="datetimeFigureOut">
               <a:rPr lang="en-US" smtClean="0"/>
-              <a:t>3/23/2016</a:t>
+              <a:t>3/24/2016</a:t>
             </a:fld>
             <a:endParaRPr lang="en-US"/>
           </a:p>
@@ -2791,7 +2791,7 @@
           <a:p>
             <a:fld id="{8BDB0DE8-2E6D-4292-891D-D68A0AAB909C}" type="datetimeFigureOut">
               <a:rPr lang="en-US" smtClean="0"/>
-              <a:t>3/23/2016</a:t>
+              <a:t>3/24/2016</a:t>
             </a:fld>
             <a:endParaRPr lang="en-US"/>
           </a:p>
@@ -3068,7 +3068,7 @@
           <a:p>
             <a:fld id="{8BDB0DE8-2E6D-4292-891D-D68A0AAB909C}" type="datetimeFigureOut">
               <a:rPr lang="en-US" smtClean="0"/>
-              <a:t>3/23/2016</a:t>
+              <a:t>3/24/2016</a:t>
             </a:fld>
             <a:endParaRPr lang="en-US"/>
           </a:p>
@@ -3321,7 +3321,7 @@
           <a:p>
             <a:fld id="{8BDB0DE8-2E6D-4292-891D-D68A0AAB909C}" type="datetimeFigureOut">
               <a:rPr lang="en-US" smtClean="0"/>
-              <a:t>3/23/2016</a:t>
+              <a:t>3/24/2016</a:t>
             </a:fld>
             <a:endParaRPr lang="en-US"/>
           </a:p>
@@ -3554,7 +3554,7 @@
           <a:p>
             <a:fld id="{8BDB0DE8-2E6D-4292-891D-D68A0AAB909C}" type="datetimeFigureOut">
               <a:rPr lang="en-US" smtClean="0"/>
-              <a:t>3/23/2016</a:t>
+              <a:t>3/24/2016</a:t>
             </a:fld>
             <a:endParaRPr lang="en-US"/>
           </a:p>
@@ -7221,12 +7221,12 @@
               <a:t> </a:t>
             </a:r>
             <a:r>
-              <a:rPr lang="en-US" dirty="0"/>
+              <a:rPr lang="en-US" dirty="0" smtClean="0"/>
               <a:t>to </a:t>
             </a:r>
             <a:r>
               <a:rPr lang="en-US" dirty="0" smtClean="0"/>
-              <a:t>connect to post to PHP files which will query </a:t>
+              <a:t>post to PHP files which will query </a:t>
             </a:r>
             <a:r>
               <a:rPr lang="en-US" dirty="0"/>

</xml_diff>